<commit_message>
Powerpoint - Updated results section structure
</commit_message>
<xml_diff>
--- a/Write up/tables_figures_structure.pptx
+++ b/Write up/tables_figures_structure.pptx
@@ -3563,7 +3563,7 @@
           <a:p>
             <a:r>
               <a:rPr lang="en-GB" sz="1400" dirty="0"/>
-              <a:t>Results table (2) – </a:t>
+              <a:t>Results table (3) – </a:t>
             </a:r>
             <a:r>
               <a:rPr lang="en-GB" sz="1400" dirty="0" err="1"/>
@@ -3649,7 +3649,7 @@
           <a:p>
             <a:r>
               <a:rPr lang="en-GB" sz="1400" dirty="0"/>
-              <a:t>Results table (3) – </a:t>
+              <a:t>Results table (4) – </a:t>
             </a:r>
             <a:r>
               <a:rPr lang="en-GB" sz="1400" dirty="0" err="1"/>
@@ -4020,7 +4020,7 @@
           <a:p>
             <a:r>
               <a:rPr lang="en-GB" sz="1400" dirty="0"/>
-              <a:t>Table (4) – Cluster analysis typologies</a:t>
+              <a:t>Table (5) – Cluster analysis typologies</a:t>
             </a:r>
           </a:p>
         </p:txBody>

</xml_diff>

<commit_message>
Updated figures/tables structure outline
</commit_message>
<xml_diff>
--- a/Write up/tables_figures_structure.pptx
+++ b/Write up/tables_figures_structure.pptx
@@ -104,6 +104,11 @@
       </a:defRPr>
     </a:lvl9pPr>
   </p:defaultTextStyle>
+  <p:extLst>
+    <p:ext uri="{EFAFB233-063F-42B5-8137-9DF3F51BA10A}">
+      <p15:sldGuideLst xmlns:p15="http://schemas.microsoft.com/office/powerpoint/2012/main"/>
+    </p:ext>
+  </p:extLst>
 </p:presentation>
 </file>
 
@@ -256,7 +261,7 @@
           <a:p>
             <a:fld id="{BAFEFBCF-4862-4726-A48F-C1F7B62D3BE8}" type="datetimeFigureOut">
               <a:rPr lang="en-GB" smtClean="0"/>
-              <a:t>20/05/2021</a:t>
+              <a:t>31/05/2021</a:t>
             </a:fld>
             <a:endParaRPr lang="en-GB"/>
           </a:p>
@@ -456,7 +461,7 @@
           <a:p>
             <a:fld id="{BAFEFBCF-4862-4726-A48F-C1F7B62D3BE8}" type="datetimeFigureOut">
               <a:rPr lang="en-GB" smtClean="0"/>
-              <a:t>20/05/2021</a:t>
+              <a:t>31/05/2021</a:t>
             </a:fld>
             <a:endParaRPr lang="en-GB"/>
           </a:p>
@@ -666,7 +671,7 @@
           <a:p>
             <a:fld id="{BAFEFBCF-4862-4726-A48F-C1F7B62D3BE8}" type="datetimeFigureOut">
               <a:rPr lang="en-GB" smtClean="0"/>
-              <a:t>20/05/2021</a:t>
+              <a:t>31/05/2021</a:t>
             </a:fld>
             <a:endParaRPr lang="en-GB"/>
           </a:p>
@@ -866,7 +871,7 @@
           <a:p>
             <a:fld id="{BAFEFBCF-4862-4726-A48F-C1F7B62D3BE8}" type="datetimeFigureOut">
               <a:rPr lang="en-GB" smtClean="0"/>
-              <a:t>20/05/2021</a:t>
+              <a:t>31/05/2021</a:t>
             </a:fld>
             <a:endParaRPr lang="en-GB"/>
           </a:p>
@@ -1142,7 +1147,7 @@
           <a:p>
             <a:fld id="{BAFEFBCF-4862-4726-A48F-C1F7B62D3BE8}" type="datetimeFigureOut">
               <a:rPr lang="en-GB" smtClean="0"/>
-              <a:t>20/05/2021</a:t>
+              <a:t>31/05/2021</a:t>
             </a:fld>
             <a:endParaRPr lang="en-GB"/>
           </a:p>
@@ -1410,7 +1415,7 @@
           <a:p>
             <a:fld id="{BAFEFBCF-4862-4726-A48F-C1F7B62D3BE8}" type="datetimeFigureOut">
               <a:rPr lang="en-GB" smtClean="0"/>
-              <a:t>20/05/2021</a:t>
+              <a:t>31/05/2021</a:t>
             </a:fld>
             <a:endParaRPr lang="en-GB"/>
           </a:p>
@@ -1825,7 +1830,7 @@
           <a:p>
             <a:fld id="{BAFEFBCF-4862-4726-A48F-C1F7B62D3BE8}" type="datetimeFigureOut">
               <a:rPr lang="en-GB" smtClean="0"/>
-              <a:t>20/05/2021</a:t>
+              <a:t>31/05/2021</a:t>
             </a:fld>
             <a:endParaRPr lang="en-GB"/>
           </a:p>
@@ -1967,7 +1972,7 @@
           <a:p>
             <a:fld id="{BAFEFBCF-4862-4726-A48F-C1F7B62D3BE8}" type="datetimeFigureOut">
               <a:rPr lang="en-GB" smtClean="0"/>
-              <a:t>20/05/2021</a:t>
+              <a:t>31/05/2021</a:t>
             </a:fld>
             <a:endParaRPr lang="en-GB"/>
           </a:p>
@@ -2080,7 +2085,7 @@
           <a:p>
             <a:fld id="{BAFEFBCF-4862-4726-A48F-C1F7B62D3BE8}" type="datetimeFigureOut">
               <a:rPr lang="en-GB" smtClean="0"/>
-              <a:t>20/05/2021</a:t>
+              <a:t>31/05/2021</a:t>
             </a:fld>
             <a:endParaRPr lang="en-GB"/>
           </a:p>
@@ -2393,7 +2398,7 @@
           <a:p>
             <a:fld id="{BAFEFBCF-4862-4726-A48F-C1F7B62D3BE8}" type="datetimeFigureOut">
               <a:rPr lang="en-GB" smtClean="0"/>
-              <a:t>20/05/2021</a:t>
+              <a:t>31/05/2021</a:t>
             </a:fld>
             <a:endParaRPr lang="en-GB"/>
           </a:p>
@@ -2682,7 +2687,7 @@
           <a:p>
             <a:fld id="{BAFEFBCF-4862-4726-A48F-C1F7B62D3BE8}" type="datetimeFigureOut">
               <a:rPr lang="en-GB" smtClean="0"/>
-              <a:t>20/05/2021</a:t>
+              <a:t>31/05/2021</a:t>
             </a:fld>
             <a:endParaRPr lang="en-GB"/>
           </a:p>
@@ -2925,7 +2930,7 @@
           <a:p>
             <a:fld id="{BAFEFBCF-4862-4726-A48F-C1F7B62D3BE8}" type="datetimeFigureOut">
               <a:rPr lang="en-GB" smtClean="0"/>
-              <a:t>20/05/2021</a:t>
+              <a:t>31/05/2021</a:t>
             </a:fld>
             <a:endParaRPr lang="en-GB"/>
           </a:p>
@@ -3449,10 +3454,10 @@
       </p:sp>
       <p:sp>
         <p:nvSpPr>
-          <p:cNvPr id="7" name="TextBox 6">
-            <a:extLst>
-              <a:ext uri="{FF2B5EF4-FFF2-40B4-BE49-F238E27FC236}">
-                <a16:creationId xmlns:a16="http://schemas.microsoft.com/office/drawing/2014/main" id="{909BABB0-3789-4433-B478-FFD014F989E3}"/>
+          <p:cNvPr id="8" name="TextBox 7">
+            <a:extLst>
+              <a:ext uri="{FF2B5EF4-FFF2-40B4-BE49-F238E27FC236}">
+                <a16:creationId xmlns:a16="http://schemas.microsoft.com/office/drawing/2014/main" id="{4F9DC44B-8FDF-4C08-9224-0C1B6619BFAE}"/>
               </a:ext>
             </a:extLst>
           </p:cNvPr>
@@ -3461,50 +3466,7 @@
         </p:nvSpPr>
         <p:spPr>
           <a:xfrm>
-            <a:off x="6615344" y="1532307"/>
-            <a:ext cx="5049914" cy="307777"/>
-          </a:xfrm>
-          <a:prstGeom prst="rect">
-            <a:avLst/>
-          </a:prstGeom>
-          <a:noFill/>
-        </p:spPr>
-        <p:txBody>
-          <a:bodyPr wrap="square" rtlCol="0">
-            <a:spAutoFit/>
-          </a:bodyPr>
-          <a:lstStyle/>
-          <a:p>
-            <a:r>
-              <a:rPr lang="en-GB" sz="1400" dirty="0"/>
-              <a:t>Results table (S3) – </a:t>
-            </a:r>
-            <a:r>
-              <a:rPr lang="en-GB" sz="1400" dirty="0" err="1"/>
-              <a:t>macroecon</a:t>
-            </a:r>
-            <a:r>
-              <a:rPr lang="en-GB" sz="1400" dirty="0"/>
-              <a:t> models with forest cover response</a:t>
-            </a:r>
-          </a:p>
-        </p:txBody>
-      </p:sp>
-      <p:sp>
-        <p:nvSpPr>
-          <p:cNvPr id="8" name="TextBox 7">
-            <a:extLst>
-              <a:ext uri="{FF2B5EF4-FFF2-40B4-BE49-F238E27FC236}">
-                <a16:creationId xmlns:a16="http://schemas.microsoft.com/office/drawing/2014/main" id="{4F9DC44B-8FDF-4C08-9224-0C1B6619BFAE}"/>
-              </a:ext>
-            </a:extLst>
-          </p:cNvPr>
-          <p:cNvSpPr txBox="1"/>
-          <p:nvPr/>
-        </p:nvSpPr>
-        <p:spPr>
-          <a:xfrm>
-            <a:off x="6615344" y="1901639"/>
+            <a:off x="6615344" y="3428600"/>
             <a:ext cx="5049914" cy="307777"/>
           </a:xfrm>
           <a:prstGeom prst="rect">
@@ -3676,7 +3638,7 @@
         </p:nvSpPr>
         <p:spPr>
           <a:xfrm>
-            <a:off x="6615344" y="2283940"/>
+            <a:off x="6615344" y="3810901"/>
             <a:ext cx="5049914" cy="307777"/>
           </a:xfrm>
           <a:prstGeom prst="rect">
@@ -3692,7 +3654,15 @@
           <a:p>
             <a:r>
               <a:rPr lang="en-GB" sz="1400" dirty="0"/>
-              <a:t>Results table (S4) – all run </a:t>
+              <a:t>Results table (Table </a:t>
+            </a:r>
+            <a:r>
+              <a:rPr lang="en-GB" sz="1400" dirty="0" err="1"/>
+              <a:t>Sx</a:t>
+            </a:r>
+            <a:r>
+              <a:rPr lang="en-GB" sz="1400" dirty="0"/>
+              <a:t>) – all run </a:t>
             </a:r>
             <a:r>
               <a:rPr lang="en-GB" sz="1400" dirty="0" err="1"/>
@@ -3805,7 +3775,7 @@
         </p:nvSpPr>
         <p:spPr>
           <a:xfrm>
-            <a:off x="6615344" y="2667402"/>
+            <a:off x="6615344" y="4194363"/>
             <a:ext cx="5049914" cy="738664"/>
           </a:xfrm>
           <a:prstGeom prst="rect">
@@ -3891,7 +3861,7 @@
         </p:nvSpPr>
         <p:spPr>
           <a:xfrm>
-            <a:off x="6615344" y="3481751"/>
+            <a:off x="6615344" y="5008712"/>
             <a:ext cx="5049914" cy="307777"/>
           </a:xfrm>
           <a:prstGeom prst="rect">
@@ -4021,6 +3991,194 @@
             <a:r>
               <a:rPr lang="en-GB" sz="1400" dirty="0"/>
               <a:t>Table (5) – Cluster analysis typologies</a:t>
+            </a:r>
+          </a:p>
+        </p:txBody>
+      </p:sp>
+      <p:sp>
+        <p:nvSpPr>
+          <p:cNvPr id="21" name="TextBox 20">
+            <a:extLst>
+              <a:ext uri="{FF2B5EF4-FFF2-40B4-BE49-F238E27FC236}">
+                <a16:creationId xmlns:a16="http://schemas.microsoft.com/office/drawing/2014/main" id="{6CA57643-2438-46E9-9200-7ED55253C5A5}"/>
+              </a:ext>
+            </a:extLst>
+          </p:cNvPr>
+          <p:cNvSpPr txBox="1"/>
+          <p:nvPr/>
+        </p:nvSpPr>
+        <p:spPr>
+          <a:xfrm>
+            <a:off x="6616822" y="2732266"/>
+            <a:ext cx="5575177" cy="523220"/>
+          </a:xfrm>
+          <a:prstGeom prst="rect">
+            <a:avLst/>
+          </a:prstGeom>
+          <a:noFill/>
+        </p:spPr>
+        <p:txBody>
+          <a:bodyPr wrap="square" rtlCol="0">
+            <a:spAutoFit/>
+          </a:bodyPr>
+          <a:lstStyle/>
+          <a:p>
+            <a:r>
+              <a:rPr lang="en-GB" sz="1400" dirty="0">
+                <a:highlight>
+                  <a:srgbClr val="FFFF00"/>
+                </a:highlight>
+              </a:rPr>
+              <a:t>Model/Results tables (Tables </a:t>
+            </a:r>
+            <a:r>
+              <a:rPr lang="en-GB" sz="1400" dirty="0" err="1">
+                <a:highlight>
+                  <a:srgbClr val="FFFF00"/>
+                </a:highlight>
+              </a:rPr>
+              <a:t>Sx:Sx</a:t>
+            </a:r>
+            <a:r>
+              <a:rPr lang="en-GB" sz="1400" dirty="0">
+                <a:highlight>
+                  <a:srgbClr val="FFFF00"/>
+                </a:highlight>
+              </a:rPr>
+              <a:t>) – </a:t>
+            </a:r>
+            <a:r>
+              <a:rPr lang="en-GB" sz="1400" dirty="0" err="1">
+                <a:highlight>
+                  <a:srgbClr val="FFFF00"/>
+                </a:highlight>
+              </a:rPr>
+              <a:t>macroecon</a:t>
+            </a:r>
+            <a:r>
+              <a:rPr lang="en-GB" sz="1400" dirty="0">
+                <a:highlight>
+                  <a:srgbClr val="FFFF00"/>
+                </a:highlight>
+              </a:rPr>
+              <a:t> models with forest cover response</a:t>
+            </a:r>
+          </a:p>
+        </p:txBody>
+      </p:sp>
+      <p:sp>
+        <p:nvSpPr>
+          <p:cNvPr id="22" name="TextBox 21">
+            <a:extLst>
+              <a:ext uri="{FF2B5EF4-FFF2-40B4-BE49-F238E27FC236}">
+                <a16:creationId xmlns:a16="http://schemas.microsoft.com/office/drawing/2014/main" id="{160D4E0A-D43D-4F55-A2D4-4105A42FD6D4}"/>
+              </a:ext>
+            </a:extLst>
+          </p:cNvPr>
+          <p:cNvSpPr txBox="1"/>
+          <p:nvPr/>
+        </p:nvSpPr>
+        <p:spPr>
+          <a:xfrm>
+            <a:off x="6627176" y="1535252"/>
+            <a:ext cx="5575177" cy="307777"/>
+          </a:xfrm>
+          <a:prstGeom prst="rect">
+            <a:avLst/>
+          </a:prstGeom>
+          <a:noFill/>
+        </p:spPr>
+        <p:txBody>
+          <a:bodyPr wrap="square" rtlCol="0">
+            <a:spAutoFit/>
+          </a:bodyPr>
+          <a:lstStyle/>
+          <a:p>
+            <a:r>
+              <a:rPr lang="en-GB" sz="1400" dirty="0" err="1"/>
+              <a:t>Macroecon</a:t>
+            </a:r>
+            <a:r>
+              <a:rPr lang="en-GB" sz="1400" dirty="0"/>
+              <a:t> predictor variable details table (Table S1)</a:t>
+            </a:r>
+          </a:p>
+        </p:txBody>
+      </p:sp>
+      <p:sp>
+        <p:nvSpPr>
+          <p:cNvPr id="23" name="TextBox 22">
+            <a:extLst>
+              <a:ext uri="{FF2B5EF4-FFF2-40B4-BE49-F238E27FC236}">
+                <a16:creationId xmlns:a16="http://schemas.microsoft.com/office/drawing/2014/main" id="{51E81968-1DB2-40C1-875B-4E9AA2784C5D}"/>
+              </a:ext>
+            </a:extLst>
+          </p:cNvPr>
+          <p:cNvSpPr txBox="1"/>
+          <p:nvPr/>
+        </p:nvSpPr>
+        <p:spPr>
+          <a:xfrm>
+            <a:off x="6615344" y="1862254"/>
+            <a:ext cx="5575177" cy="307777"/>
+          </a:xfrm>
+          <a:prstGeom prst="rect">
+            <a:avLst/>
+          </a:prstGeom>
+          <a:noFill/>
+        </p:spPr>
+        <p:txBody>
+          <a:bodyPr wrap="square" rtlCol="0">
+            <a:spAutoFit/>
+          </a:bodyPr>
+          <a:lstStyle/>
+          <a:p>
+            <a:r>
+              <a:rPr lang="en-GB" sz="1400" dirty="0"/>
+              <a:t>Forest cover layer CCI bands (Table S2)</a:t>
+            </a:r>
+          </a:p>
+        </p:txBody>
+      </p:sp>
+      <p:sp>
+        <p:nvSpPr>
+          <p:cNvPr id="24" name="TextBox 23">
+            <a:extLst>
+              <a:ext uri="{FF2B5EF4-FFF2-40B4-BE49-F238E27FC236}">
+                <a16:creationId xmlns:a16="http://schemas.microsoft.com/office/drawing/2014/main" id="{1EF0E27D-9383-40DC-B13F-62F3600CBF7C}"/>
+              </a:ext>
+            </a:extLst>
+          </p:cNvPr>
+          <p:cNvSpPr txBox="1"/>
+          <p:nvPr/>
+        </p:nvSpPr>
+        <p:spPr>
+          <a:xfrm>
+            <a:off x="6616823" y="2196422"/>
+            <a:ext cx="5575177" cy="523220"/>
+          </a:xfrm>
+          <a:prstGeom prst="rect">
+            <a:avLst/>
+          </a:prstGeom>
+          <a:noFill/>
+        </p:spPr>
+        <p:txBody>
+          <a:bodyPr wrap="square" rtlCol="0">
+            <a:spAutoFit/>
+          </a:bodyPr>
+          <a:lstStyle/>
+          <a:p>
+            <a:r>
+              <a:rPr lang="en-GB" sz="1400" dirty="0"/>
+              <a:t>Model/Results tables (Tables S3:S11) – </a:t>
+            </a:r>
+            <a:r>
+              <a:rPr lang="en-GB" sz="1400" dirty="0" err="1"/>
+              <a:t>macroecon</a:t>
+            </a:r>
+            <a:r>
+              <a:rPr lang="en-GB" sz="1400" dirty="0"/>
+              <a:t> models with ELC response</a:t>
             </a:r>
           </a:p>
         </p:txBody>

</xml_diff>

<commit_message>
updating figures/tables structure powerpoint
</commit_message>
<xml_diff>
--- a/Write up/tables_figures_structure.pptx
+++ b/Write up/tables_figures_structure.pptx
@@ -261,7 +261,7 @@
           <a:p>
             <a:fld id="{BAFEFBCF-4862-4726-A48F-C1F7B62D3BE8}" type="datetimeFigureOut">
               <a:rPr lang="en-GB" smtClean="0"/>
-              <a:t>31/05/2021</a:t>
+              <a:t>01/06/2021</a:t>
             </a:fld>
             <a:endParaRPr lang="en-GB"/>
           </a:p>
@@ -461,7 +461,7 @@
           <a:p>
             <a:fld id="{BAFEFBCF-4862-4726-A48F-C1F7B62D3BE8}" type="datetimeFigureOut">
               <a:rPr lang="en-GB" smtClean="0"/>
-              <a:t>31/05/2021</a:t>
+              <a:t>01/06/2021</a:t>
             </a:fld>
             <a:endParaRPr lang="en-GB"/>
           </a:p>
@@ -671,7 +671,7 @@
           <a:p>
             <a:fld id="{BAFEFBCF-4862-4726-A48F-C1F7B62D3BE8}" type="datetimeFigureOut">
               <a:rPr lang="en-GB" smtClean="0"/>
-              <a:t>31/05/2021</a:t>
+              <a:t>01/06/2021</a:t>
             </a:fld>
             <a:endParaRPr lang="en-GB"/>
           </a:p>
@@ -871,7 +871,7 @@
           <a:p>
             <a:fld id="{BAFEFBCF-4862-4726-A48F-C1F7B62D3BE8}" type="datetimeFigureOut">
               <a:rPr lang="en-GB" smtClean="0"/>
-              <a:t>31/05/2021</a:t>
+              <a:t>01/06/2021</a:t>
             </a:fld>
             <a:endParaRPr lang="en-GB"/>
           </a:p>
@@ -1147,7 +1147,7 @@
           <a:p>
             <a:fld id="{BAFEFBCF-4862-4726-A48F-C1F7B62D3BE8}" type="datetimeFigureOut">
               <a:rPr lang="en-GB" smtClean="0"/>
-              <a:t>31/05/2021</a:t>
+              <a:t>01/06/2021</a:t>
             </a:fld>
             <a:endParaRPr lang="en-GB"/>
           </a:p>
@@ -1415,7 +1415,7 @@
           <a:p>
             <a:fld id="{BAFEFBCF-4862-4726-A48F-C1F7B62D3BE8}" type="datetimeFigureOut">
               <a:rPr lang="en-GB" smtClean="0"/>
-              <a:t>31/05/2021</a:t>
+              <a:t>01/06/2021</a:t>
             </a:fld>
             <a:endParaRPr lang="en-GB"/>
           </a:p>
@@ -1830,7 +1830,7 @@
           <a:p>
             <a:fld id="{BAFEFBCF-4862-4726-A48F-C1F7B62D3BE8}" type="datetimeFigureOut">
               <a:rPr lang="en-GB" smtClean="0"/>
-              <a:t>31/05/2021</a:t>
+              <a:t>01/06/2021</a:t>
             </a:fld>
             <a:endParaRPr lang="en-GB"/>
           </a:p>
@@ -1972,7 +1972,7 @@
           <a:p>
             <a:fld id="{BAFEFBCF-4862-4726-A48F-C1F7B62D3BE8}" type="datetimeFigureOut">
               <a:rPr lang="en-GB" smtClean="0"/>
-              <a:t>31/05/2021</a:t>
+              <a:t>01/06/2021</a:t>
             </a:fld>
             <a:endParaRPr lang="en-GB"/>
           </a:p>
@@ -2085,7 +2085,7 @@
           <a:p>
             <a:fld id="{BAFEFBCF-4862-4726-A48F-C1F7B62D3BE8}" type="datetimeFigureOut">
               <a:rPr lang="en-GB" smtClean="0"/>
-              <a:t>31/05/2021</a:t>
+              <a:t>01/06/2021</a:t>
             </a:fld>
             <a:endParaRPr lang="en-GB"/>
           </a:p>
@@ -2398,7 +2398,7 @@
           <a:p>
             <a:fld id="{BAFEFBCF-4862-4726-A48F-C1F7B62D3BE8}" type="datetimeFigureOut">
               <a:rPr lang="en-GB" smtClean="0"/>
-              <a:t>31/05/2021</a:t>
+              <a:t>01/06/2021</a:t>
             </a:fld>
             <a:endParaRPr lang="en-GB"/>
           </a:p>
@@ -2687,7 +2687,7 @@
           <a:p>
             <a:fld id="{BAFEFBCF-4862-4726-A48F-C1F7B62D3BE8}" type="datetimeFigureOut">
               <a:rPr lang="en-GB" smtClean="0"/>
-              <a:t>31/05/2021</a:t>
+              <a:t>01/06/2021</a:t>
             </a:fld>
             <a:endParaRPr lang="en-GB"/>
           </a:p>
@@ -2930,7 +2930,7 @@
           <a:p>
             <a:fld id="{BAFEFBCF-4862-4726-A48F-C1F7B62D3BE8}" type="datetimeFigureOut">
               <a:rPr lang="en-GB" smtClean="0"/>
-              <a:t>31/05/2021</a:t>
+              <a:t>01/06/2021</a:t>
             </a:fld>
             <a:endParaRPr lang="en-GB"/>
           </a:p>
@@ -3472,7 +3472,9 @@
           <a:prstGeom prst="rect">
             <a:avLst/>
           </a:prstGeom>
-          <a:noFill/>
+          <a:solidFill>
+            <a:srgbClr val="92D050"/>
+          </a:solidFill>
         </p:spPr>
         <p:txBody>
           <a:bodyPr wrap="square" rtlCol="0">
@@ -3509,13 +3511,15 @@
         </p:nvSpPr>
         <p:spPr>
           <a:xfrm>
-            <a:off x="284083" y="1532306"/>
+            <a:off x="284083" y="1629961"/>
             <a:ext cx="5049914" cy="307777"/>
           </a:xfrm>
           <a:prstGeom prst="rect">
             <a:avLst/>
           </a:prstGeom>
-          <a:noFill/>
+          <a:solidFill>
+            <a:srgbClr val="92D050"/>
+          </a:solidFill>
         </p:spPr>
         <p:txBody>
           <a:bodyPr wrap="square" rtlCol="0">
@@ -3552,13 +3556,15 @@
         </p:nvSpPr>
         <p:spPr>
           <a:xfrm>
-            <a:off x="284083" y="1901639"/>
+            <a:off x="284083" y="1999294"/>
             <a:ext cx="5049914" cy="307777"/>
           </a:xfrm>
           <a:prstGeom prst="rect">
             <a:avLst/>
           </a:prstGeom>
-          <a:noFill/>
+          <a:solidFill>
+            <a:srgbClr val="92D050"/>
+          </a:solidFill>
         </p:spPr>
         <p:txBody>
           <a:bodyPr wrap="square" rtlCol="0">
@@ -3595,13 +3601,15 @@
         </p:nvSpPr>
         <p:spPr>
           <a:xfrm>
-            <a:off x="284083" y="2283940"/>
+            <a:off x="284083" y="2381595"/>
             <a:ext cx="5049914" cy="523220"/>
           </a:xfrm>
           <a:prstGeom prst="rect">
             <a:avLst/>
           </a:prstGeom>
-          <a:noFill/>
+          <a:solidFill>
+            <a:srgbClr val="92D050"/>
+          </a:solidFill>
         </p:spPr>
         <p:txBody>
           <a:bodyPr wrap="square" rtlCol="0">
@@ -3689,7 +3697,7 @@
         </p:nvSpPr>
         <p:spPr>
           <a:xfrm>
-            <a:off x="284083" y="2819546"/>
+            <a:off x="284083" y="2917201"/>
             <a:ext cx="5049914" cy="307777"/>
           </a:xfrm>
           <a:prstGeom prst="rect">
@@ -3732,7 +3740,7 @@
         </p:nvSpPr>
         <p:spPr>
           <a:xfrm>
-            <a:off x="284083" y="3177594"/>
+            <a:off x="284083" y="3275249"/>
             <a:ext cx="5049914" cy="523220"/>
           </a:xfrm>
           <a:prstGeom prst="rect">
@@ -3818,7 +3826,7 @@
         </p:nvSpPr>
         <p:spPr>
           <a:xfrm>
-            <a:off x="284083" y="3751085"/>
+            <a:off x="284083" y="3848740"/>
             <a:ext cx="5049914" cy="307777"/>
           </a:xfrm>
           <a:prstGeom prst="rect">
@@ -3904,7 +3912,7 @@
         </p:nvSpPr>
         <p:spPr>
           <a:xfrm>
-            <a:off x="284083" y="4109133"/>
+            <a:off x="284083" y="4206788"/>
             <a:ext cx="5049914" cy="307777"/>
           </a:xfrm>
           <a:prstGeom prst="rect">
@@ -3939,7 +3947,7 @@
         </p:nvSpPr>
         <p:spPr>
           <a:xfrm>
-            <a:off x="284083" y="4467181"/>
+            <a:off x="284083" y="4564836"/>
             <a:ext cx="5049914" cy="307777"/>
           </a:xfrm>
           <a:prstGeom prst="rect">
@@ -3974,7 +3982,7 @@
         </p:nvSpPr>
         <p:spPr>
           <a:xfrm>
-            <a:off x="284083" y="4803626"/>
+            <a:off x="284083" y="4901281"/>
             <a:ext cx="5049914" cy="307777"/>
           </a:xfrm>
           <a:prstGeom prst="rect">
@@ -4015,7 +4023,9 @@
           <a:prstGeom prst="rect">
             <a:avLst/>
           </a:prstGeom>
-          <a:noFill/>
+          <a:solidFill>
+            <a:srgbClr val="92D050"/>
+          </a:solidFill>
         </p:spPr>
         <p:txBody>
           <a:bodyPr wrap="square" rtlCol="0">
@@ -4024,43 +4034,23 @@
           <a:lstStyle/>
           <a:p>
             <a:r>
-              <a:rPr lang="en-GB" sz="1400" dirty="0">
-                <a:highlight>
-                  <a:srgbClr val="FFFF00"/>
-                </a:highlight>
-              </a:rPr>
+              <a:rPr lang="en-GB" sz="1400" dirty="0"/>
               <a:t>Model/Results tables (Tables </a:t>
             </a:r>
             <a:r>
-              <a:rPr lang="en-GB" sz="1400" dirty="0" err="1">
-                <a:highlight>
-                  <a:srgbClr val="FFFF00"/>
-                </a:highlight>
-              </a:rPr>
+              <a:rPr lang="en-GB" sz="1400" dirty="0" err="1"/>
               <a:t>Sx:Sx</a:t>
             </a:r>
             <a:r>
-              <a:rPr lang="en-GB" sz="1400" dirty="0">
-                <a:highlight>
-                  <a:srgbClr val="FFFF00"/>
-                </a:highlight>
-              </a:rPr>
+              <a:rPr lang="en-GB" sz="1400" dirty="0"/>
               <a:t>) – </a:t>
             </a:r>
             <a:r>
-              <a:rPr lang="en-GB" sz="1400" dirty="0" err="1">
-                <a:highlight>
-                  <a:srgbClr val="FFFF00"/>
-                </a:highlight>
-              </a:rPr>
+              <a:rPr lang="en-GB" sz="1400" dirty="0" err="1"/>
               <a:t>macroecon</a:t>
             </a:r>
             <a:r>
-              <a:rPr lang="en-GB" sz="1400" dirty="0">
-                <a:highlight>
-                  <a:srgbClr val="FFFF00"/>
-                </a:highlight>
-              </a:rPr>
+              <a:rPr lang="en-GB" sz="1400" dirty="0"/>
               <a:t> models with forest cover response</a:t>
             </a:r>
           </a:p>
@@ -4086,7 +4076,9 @@
           <a:prstGeom prst="rect">
             <a:avLst/>
           </a:prstGeom>
-          <a:noFill/>
+          <a:solidFill>
+            <a:srgbClr val="92D050"/>
+          </a:solidFill>
         </p:spPr>
         <p:txBody>
           <a:bodyPr wrap="square" rtlCol="0">
@@ -4125,7 +4117,9 @@
           <a:prstGeom prst="rect">
             <a:avLst/>
           </a:prstGeom>
-          <a:noFill/>
+          <a:solidFill>
+            <a:srgbClr val="92D050"/>
+          </a:solidFill>
         </p:spPr>
         <p:txBody>
           <a:bodyPr wrap="square" rtlCol="0">
@@ -4160,7 +4154,9 @@
           <a:prstGeom prst="rect">
             <a:avLst/>
           </a:prstGeom>
-          <a:noFill/>
+          <a:solidFill>
+            <a:srgbClr val="92D050"/>
+          </a:solidFill>
         </p:spPr>
         <p:txBody>
           <a:bodyPr wrap="square" rtlCol="0">

</xml_diff>

<commit_message>
Updated figure/table structure powerpoint
</commit_message>
<xml_diff>
--- a/Write up/tables_figures_structure.pptx
+++ b/Write up/tables_figures_structure.pptx
@@ -261,7 +261,7 @@
           <a:p>
             <a:fld id="{BAFEFBCF-4862-4726-A48F-C1F7B62D3BE8}" type="datetimeFigureOut">
               <a:rPr lang="en-GB" smtClean="0"/>
-              <a:t>01/06/2021</a:t>
+              <a:t>02/06/2021</a:t>
             </a:fld>
             <a:endParaRPr lang="en-GB"/>
           </a:p>
@@ -461,7 +461,7 @@
           <a:p>
             <a:fld id="{BAFEFBCF-4862-4726-A48F-C1F7B62D3BE8}" type="datetimeFigureOut">
               <a:rPr lang="en-GB" smtClean="0"/>
-              <a:t>01/06/2021</a:t>
+              <a:t>02/06/2021</a:t>
             </a:fld>
             <a:endParaRPr lang="en-GB"/>
           </a:p>
@@ -671,7 +671,7 @@
           <a:p>
             <a:fld id="{BAFEFBCF-4862-4726-A48F-C1F7B62D3BE8}" type="datetimeFigureOut">
               <a:rPr lang="en-GB" smtClean="0"/>
-              <a:t>01/06/2021</a:t>
+              <a:t>02/06/2021</a:t>
             </a:fld>
             <a:endParaRPr lang="en-GB"/>
           </a:p>
@@ -871,7 +871,7 @@
           <a:p>
             <a:fld id="{BAFEFBCF-4862-4726-A48F-C1F7B62D3BE8}" type="datetimeFigureOut">
               <a:rPr lang="en-GB" smtClean="0"/>
-              <a:t>01/06/2021</a:t>
+              <a:t>02/06/2021</a:t>
             </a:fld>
             <a:endParaRPr lang="en-GB"/>
           </a:p>
@@ -1147,7 +1147,7 @@
           <a:p>
             <a:fld id="{BAFEFBCF-4862-4726-A48F-C1F7B62D3BE8}" type="datetimeFigureOut">
               <a:rPr lang="en-GB" smtClean="0"/>
-              <a:t>01/06/2021</a:t>
+              <a:t>02/06/2021</a:t>
             </a:fld>
             <a:endParaRPr lang="en-GB"/>
           </a:p>
@@ -1415,7 +1415,7 @@
           <a:p>
             <a:fld id="{BAFEFBCF-4862-4726-A48F-C1F7B62D3BE8}" type="datetimeFigureOut">
               <a:rPr lang="en-GB" smtClean="0"/>
-              <a:t>01/06/2021</a:t>
+              <a:t>02/06/2021</a:t>
             </a:fld>
             <a:endParaRPr lang="en-GB"/>
           </a:p>
@@ -1830,7 +1830,7 @@
           <a:p>
             <a:fld id="{BAFEFBCF-4862-4726-A48F-C1F7B62D3BE8}" type="datetimeFigureOut">
               <a:rPr lang="en-GB" smtClean="0"/>
-              <a:t>01/06/2021</a:t>
+              <a:t>02/06/2021</a:t>
             </a:fld>
             <a:endParaRPr lang="en-GB"/>
           </a:p>
@@ -1972,7 +1972,7 @@
           <a:p>
             <a:fld id="{BAFEFBCF-4862-4726-A48F-C1F7B62D3BE8}" type="datetimeFigureOut">
               <a:rPr lang="en-GB" smtClean="0"/>
-              <a:t>01/06/2021</a:t>
+              <a:t>02/06/2021</a:t>
             </a:fld>
             <a:endParaRPr lang="en-GB"/>
           </a:p>
@@ -2085,7 +2085,7 @@
           <a:p>
             <a:fld id="{BAFEFBCF-4862-4726-A48F-C1F7B62D3BE8}" type="datetimeFigureOut">
               <a:rPr lang="en-GB" smtClean="0"/>
-              <a:t>01/06/2021</a:t>
+              <a:t>02/06/2021</a:t>
             </a:fld>
             <a:endParaRPr lang="en-GB"/>
           </a:p>
@@ -2398,7 +2398,7 @@
           <a:p>
             <a:fld id="{BAFEFBCF-4862-4726-A48F-C1F7B62D3BE8}" type="datetimeFigureOut">
               <a:rPr lang="en-GB" smtClean="0"/>
-              <a:t>01/06/2021</a:t>
+              <a:t>02/06/2021</a:t>
             </a:fld>
             <a:endParaRPr lang="en-GB"/>
           </a:p>
@@ -2687,7 +2687,7 @@
           <a:p>
             <a:fld id="{BAFEFBCF-4862-4726-A48F-C1F7B62D3BE8}" type="datetimeFigureOut">
               <a:rPr lang="en-GB" smtClean="0"/>
-              <a:t>01/06/2021</a:t>
+              <a:t>02/06/2021</a:t>
             </a:fld>
             <a:endParaRPr lang="en-GB"/>
           </a:p>
@@ -2930,7 +2930,7 @@
           <a:p>
             <a:fld id="{BAFEFBCF-4862-4726-A48F-C1F7B62D3BE8}" type="datetimeFigureOut">
               <a:rPr lang="en-GB" smtClean="0"/>
-              <a:t>01/06/2021</a:t>
+              <a:t>02/06/2021</a:t>
             </a:fld>
             <a:endParaRPr lang="en-GB"/>
           </a:p>
@@ -3698,7 +3698,7 @@
         <p:spPr>
           <a:xfrm>
             <a:off x="284083" y="2917201"/>
-            <a:ext cx="5049914" cy="307777"/>
+            <a:ext cx="5049914" cy="523220"/>
           </a:xfrm>
           <a:prstGeom prst="rect">
             <a:avLst/>
@@ -3723,7 +3723,7 @@
             </a:r>
             <a:r>
               <a:rPr lang="en-GB" sz="1400" dirty="0"/>
-              <a:t> global model predictions with points</a:t>
+              <a:t> Commune – level top model predictions with points</a:t>
             </a:r>
           </a:p>
         </p:txBody>
@@ -3742,13 +3742,15 @@
         </p:nvSpPr>
         <p:spPr>
           <a:xfrm>
-            <a:off x="284083" y="3275249"/>
+            <a:off x="284083" y="3541580"/>
             <a:ext cx="5049914" cy="523220"/>
           </a:xfrm>
           <a:prstGeom prst="rect">
             <a:avLst/>
           </a:prstGeom>
-          <a:noFill/>
+          <a:solidFill>
+            <a:srgbClr val="92D050"/>
+          </a:solidFill>
         </p:spPr>
         <p:txBody>
           <a:bodyPr wrap="square" rtlCol="0">
@@ -3766,7 +3768,7 @@
             </a:r>
             <a:r>
               <a:rPr lang="en-GB" sz="1400" dirty="0"/>
-              <a:t> global model province-level predictions with mean and commune-level lines</a:t>
+              <a:t> commune-level top model province-level predictions with mean and commune-level lines</a:t>
             </a:r>
           </a:p>
         </p:txBody>
@@ -3828,7 +3830,7 @@
         </p:nvSpPr>
         <p:spPr>
           <a:xfrm>
-            <a:off x="284083" y="3848740"/>
+            <a:off x="284083" y="4115071"/>
             <a:ext cx="5049914" cy="307777"/>
           </a:xfrm>
           <a:prstGeom prst="rect">
@@ -3852,7 +3854,7 @@
             </a:r>
             <a:r>
               <a:rPr lang="en-GB" sz="1400" dirty="0"/>
-              <a:t> province-level categorical models</a:t>
+              <a:t> province-level categorical top model</a:t>
             </a:r>
           </a:p>
         </p:txBody>
@@ -3914,7 +3916,7 @@
         </p:nvSpPr>
         <p:spPr>
           <a:xfrm>
-            <a:off x="284083" y="4206788"/>
+            <a:off x="284083" y="4473119"/>
             <a:ext cx="5049914" cy="307777"/>
           </a:xfrm>
           <a:prstGeom prst="rect">
@@ -3949,7 +3951,7 @@
         </p:nvSpPr>
         <p:spPr>
           <a:xfrm>
-            <a:off x="284083" y="4564836"/>
+            <a:off x="284083" y="4831167"/>
             <a:ext cx="5049914" cy="307777"/>
           </a:xfrm>
           <a:prstGeom prst="rect">
@@ -3984,7 +3986,7 @@
         </p:nvSpPr>
         <p:spPr>
           <a:xfrm>
-            <a:off x="284083" y="4901281"/>
+            <a:off x="284083" y="5167612"/>
             <a:ext cx="5049914" cy="307777"/>
           </a:xfrm>
           <a:prstGeom prst="rect">

</xml_diff>

<commit_message>
Tables updated and results section structure updated
</commit_message>
<xml_diff>
--- a/Write up/tables_figures_structure.pptx
+++ b/Write up/tables_figures_structure.pptx
@@ -261,7 +261,7 @@
           <a:p>
             <a:fld id="{BAFEFBCF-4862-4726-A48F-C1F7B62D3BE8}" type="datetimeFigureOut">
               <a:rPr lang="en-GB" smtClean="0"/>
-              <a:t>03/06/2021</a:t>
+              <a:t>04/06/2021</a:t>
             </a:fld>
             <a:endParaRPr lang="en-GB"/>
           </a:p>
@@ -461,7 +461,7 @@
           <a:p>
             <a:fld id="{BAFEFBCF-4862-4726-A48F-C1F7B62D3BE8}" type="datetimeFigureOut">
               <a:rPr lang="en-GB" smtClean="0"/>
-              <a:t>03/06/2021</a:t>
+              <a:t>04/06/2021</a:t>
             </a:fld>
             <a:endParaRPr lang="en-GB"/>
           </a:p>
@@ -671,7 +671,7 @@
           <a:p>
             <a:fld id="{BAFEFBCF-4862-4726-A48F-C1F7B62D3BE8}" type="datetimeFigureOut">
               <a:rPr lang="en-GB" smtClean="0"/>
-              <a:t>03/06/2021</a:t>
+              <a:t>04/06/2021</a:t>
             </a:fld>
             <a:endParaRPr lang="en-GB"/>
           </a:p>
@@ -871,7 +871,7 @@
           <a:p>
             <a:fld id="{BAFEFBCF-4862-4726-A48F-C1F7B62D3BE8}" type="datetimeFigureOut">
               <a:rPr lang="en-GB" smtClean="0"/>
-              <a:t>03/06/2021</a:t>
+              <a:t>04/06/2021</a:t>
             </a:fld>
             <a:endParaRPr lang="en-GB"/>
           </a:p>
@@ -1147,7 +1147,7 @@
           <a:p>
             <a:fld id="{BAFEFBCF-4862-4726-A48F-C1F7B62D3BE8}" type="datetimeFigureOut">
               <a:rPr lang="en-GB" smtClean="0"/>
-              <a:t>03/06/2021</a:t>
+              <a:t>04/06/2021</a:t>
             </a:fld>
             <a:endParaRPr lang="en-GB"/>
           </a:p>
@@ -1415,7 +1415,7 @@
           <a:p>
             <a:fld id="{BAFEFBCF-4862-4726-A48F-C1F7B62D3BE8}" type="datetimeFigureOut">
               <a:rPr lang="en-GB" smtClean="0"/>
-              <a:t>03/06/2021</a:t>
+              <a:t>04/06/2021</a:t>
             </a:fld>
             <a:endParaRPr lang="en-GB"/>
           </a:p>
@@ -1830,7 +1830,7 @@
           <a:p>
             <a:fld id="{BAFEFBCF-4862-4726-A48F-C1F7B62D3BE8}" type="datetimeFigureOut">
               <a:rPr lang="en-GB" smtClean="0"/>
-              <a:t>03/06/2021</a:t>
+              <a:t>04/06/2021</a:t>
             </a:fld>
             <a:endParaRPr lang="en-GB"/>
           </a:p>
@@ -1972,7 +1972,7 @@
           <a:p>
             <a:fld id="{BAFEFBCF-4862-4726-A48F-C1F7B62D3BE8}" type="datetimeFigureOut">
               <a:rPr lang="en-GB" smtClean="0"/>
-              <a:t>03/06/2021</a:t>
+              <a:t>04/06/2021</a:t>
             </a:fld>
             <a:endParaRPr lang="en-GB"/>
           </a:p>
@@ -2085,7 +2085,7 @@
           <a:p>
             <a:fld id="{BAFEFBCF-4862-4726-A48F-C1F7B62D3BE8}" type="datetimeFigureOut">
               <a:rPr lang="en-GB" smtClean="0"/>
-              <a:t>03/06/2021</a:t>
+              <a:t>04/06/2021</a:t>
             </a:fld>
             <a:endParaRPr lang="en-GB"/>
           </a:p>
@@ -2398,7 +2398,7 @@
           <a:p>
             <a:fld id="{BAFEFBCF-4862-4726-A48F-C1F7B62D3BE8}" type="datetimeFigureOut">
               <a:rPr lang="en-GB" smtClean="0"/>
-              <a:t>03/06/2021</a:t>
+              <a:t>04/06/2021</a:t>
             </a:fld>
             <a:endParaRPr lang="en-GB"/>
           </a:p>
@@ -2687,7 +2687,7 @@
           <a:p>
             <a:fld id="{BAFEFBCF-4862-4726-A48F-C1F7B62D3BE8}" type="datetimeFigureOut">
               <a:rPr lang="en-GB" smtClean="0"/>
-              <a:t>03/06/2021</a:t>
+              <a:t>04/06/2021</a:t>
             </a:fld>
             <a:endParaRPr lang="en-GB"/>
           </a:p>
@@ -2930,7 +2930,7 @@
           <a:p>
             <a:fld id="{BAFEFBCF-4862-4726-A48F-C1F7B62D3BE8}" type="datetimeFigureOut">
               <a:rPr lang="en-GB" smtClean="0"/>
-              <a:t>03/06/2021</a:t>
+              <a:t>04/06/2021</a:t>
             </a:fld>
             <a:endParaRPr lang="en-GB"/>
           </a:p>
@@ -3652,7 +3652,9 @@
           <a:prstGeom prst="rect">
             <a:avLst/>
           </a:prstGeom>
-          <a:noFill/>
+          <a:solidFill>
+            <a:srgbClr val="92D050"/>
+          </a:solidFill>
         </p:spPr>
         <p:txBody>
           <a:bodyPr wrap="square" rtlCol="0">
@@ -3793,7 +3795,9 @@
           <a:prstGeom prst="rect">
             <a:avLst/>
           </a:prstGeom>
-          <a:noFill/>
+          <a:solidFill>
+            <a:srgbClr val="92D050"/>
+          </a:solidFill>
         </p:spPr>
         <p:txBody>
           <a:bodyPr wrap="square" rtlCol="0">
@@ -3857,49 +3861,6 @@
             <a:r>
               <a:rPr lang="en-GB" sz="1400" dirty="0"/>
               <a:t> province-level categorical top model</a:t>
-            </a:r>
-          </a:p>
-        </p:txBody>
-      </p:sp>
-      <p:sp>
-        <p:nvSpPr>
-          <p:cNvPr id="17" name="TextBox 16">
-            <a:extLst>
-              <a:ext uri="{FF2B5EF4-FFF2-40B4-BE49-F238E27FC236}">
-                <a16:creationId xmlns:a16="http://schemas.microsoft.com/office/drawing/2014/main" id="{C7FBF8EC-3396-404F-B8C3-501949A9DAA8}"/>
-              </a:ext>
-            </a:extLst>
-          </p:cNvPr>
-          <p:cNvSpPr txBox="1"/>
-          <p:nvPr/>
-        </p:nvSpPr>
-        <p:spPr>
-          <a:xfrm>
-            <a:off x="6615344" y="5008712"/>
-            <a:ext cx="5049914" cy="307777"/>
-          </a:xfrm>
-          <a:prstGeom prst="rect">
-            <a:avLst/>
-          </a:prstGeom>
-          <a:noFill/>
-        </p:spPr>
-        <p:txBody>
-          <a:bodyPr wrap="square" rtlCol="0">
-            <a:spAutoFit/>
-          </a:bodyPr>
-          <a:lstStyle/>
-          <a:p>
-            <a:r>
-              <a:rPr lang="en-GB" sz="1400" dirty="0"/>
-              <a:t>Figure – </a:t>
-            </a:r>
-            <a:r>
-              <a:rPr lang="en-GB" sz="1400" dirty="0" err="1"/>
-              <a:t>Socioecon</a:t>
-            </a:r>
-            <a:r>
-              <a:rPr lang="en-GB" sz="1400" dirty="0"/>
-              <a:t> province-level continuous models</a:t>
             </a:r>
           </a:p>
         </p:txBody>

</xml_diff>

<commit_message>
results structure PPT updated
</commit_message>
<xml_diff>
--- a/Write up/tables_figures_structure.pptx
+++ b/Write up/tables_figures_structure.pptx
@@ -261,7 +261,7 @@
           <a:p>
             <a:fld id="{BAFEFBCF-4862-4726-A48F-C1F7B62D3BE8}" type="datetimeFigureOut">
               <a:rPr lang="en-GB" smtClean="0"/>
-              <a:t>04/06/2021</a:t>
+              <a:t>26/06/2021</a:t>
             </a:fld>
             <a:endParaRPr lang="en-GB"/>
           </a:p>
@@ -461,7 +461,7 @@
           <a:p>
             <a:fld id="{BAFEFBCF-4862-4726-A48F-C1F7B62D3BE8}" type="datetimeFigureOut">
               <a:rPr lang="en-GB" smtClean="0"/>
-              <a:t>04/06/2021</a:t>
+              <a:t>26/06/2021</a:t>
             </a:fld>
             <a:endParaRPr lang="en-GB"/>
           </a:p>
@@ -671,7 +671,7 @@
           <a:p>
             <a:fld id="{BAFEFBCF-4862-4726-A48F-C1F7B62D3BE8}" type="datetimeFigureOut">
               <a:rPr lang="en-GB" smtClean="0"/>
-              <a:t>04/06/2021</a:t>
+              <a:t>26/06/2021</a:t>
             </a:fld>
             <a:endParaRPr lang="en-GB"/>
           </a:p>
@@ -871,7 +871,7 @@
           <a:p>
             <a:fld id="{BAFEFBCF-4862-4726-A48F-C1F7B62D3BE8}" type="datetimeFigureOut">
               <a:rPr lang="en-GB" smtClean="0"/>
-              <a:t>04/06/2021</a:t>
+              <a:t>26/06/2021</a:t>
             </a:fld>
             <a:endParaRPr lang="en-GB"/>
           </a:p>
@@ -1147,7 +1147,7 @@
           <a:p>
             <a:fld id="{BAFEFBCF-4862-4726-A48F-C1F7B62D3BE8}" type="datetimeFigureOut">
               <a:rPr lang="en-GB" smtClean="0"/>
-              <a:t>04/06/2021</a:t>
+              <a:t>26/06/2021</a:t>
             </a:fld>
             <a:endParaRPr lang="en-GB"/>
           </a:p>
@@ -1415,7 +1415,7 @@
           <a:p>
             <a:fld id="{BAFEFBCF-4862-4726-A48F-C1F7B62D3BE8}" type="datetimeFigureOut">
               <a:rPr lang="en-GB" smtClean="0"/>
-              <a:t>04/06/2021</a:t>
+              <a:t>26/06/2021</a:t>
             </a:fld>
             <a:endParaRPr lang="en-GB"/>
           </a:p>
@@ -1830,7 +1830,7 @@
           <a:p>
             <a:fld id="{BAFEFBCF-4862-4726-A48F-C1F7B62D3BE8}" type="datetimeFigureOut">
               <a:rPr lang="en-GB" smtClean="0"/>
-              <a:t>04/06/2021</a:t>
+              <a:t>26/06/2021</a:t>
             </a:fld>
             <a:endParaRPr lang="en-GB"/>
           </a:p>
@@ -1972,7 +1972,7 @@
           <a:p>
             <a:fld id="{BAFEFBCF-4862-4726-A48F-C1F7B62D3BE8}" type="datetimeFigureOut">
               <a:rPr lang="en-GB" smtClean="0"/>
-              <a:t>04/06/2021</a:t>
+              <a:t>26/06/2021</a:t>
             </a:fld>
             <a:endParaRPr lang="en-GB"/>
           </a:p>
@@ -2085,7 +2085,7 @@
           <a:p>
             <a:fld id="{BAFEFBCF-4862-4726-A48F-C1F7B62D3BE8}" type="datetimeFigureOut">
               <a:rPr lang="en-GB" smtClean="0"/>
-              <a:t>04/06/2021</a:t>
+              <a:t>26/06/2021</a:t>
             </a:fld>
             <a:endParaRPr lang="en-GB"/>
           </a:p>
@@ -2398,7 +2398,7 @@
           <a:p>
             <a:fld id="{BAFEFBCF-4862-4726-A48F-C1F7B62D3BE8}" type="datetimeFigureOut">
               <a:rPr lang="en-GB" smtClean="0"/>
-              <a:t>04/06/2021</a:t>
+              <a:t>26/06/2021</a:t>
             </a:fld>
             <a:endParaRPr lang="en-GB"/>
           </a:p>
@@ -2687,7 +2687,7 @@
           <a:p>
             <a:fld id="{BAFEFBCF-4862-4726-A48F-C1F7B62D3BE8}" type="datetimeFigureOut">
               <a:rPr lang="en-GB" smtClean="0"/>
-              <a:t>04/06/2021</a:t>
+              <a:t>26/06/2021</a:t>
             </a:fld>
             <a:endParaRPr lang="en-GB"/>
           </a:p>
@@ -2930,7 +2930,7 @@
           <a:p>
             <a:fld id="{BAFEFBCF-4862-4726-A48F-C1F7B62D3BE8}" type="datetimeFigureOut">
               <a:rPr lang="en-GB" smtClean="0"/>
-              <a:t>04/06/2021</a:t>
+              <a:t>26/06/2021</a:t>
             </a:fld>
             <a:endParaRPr lang="en-GB"/>
           </a:p>

</xml_diff>